<commit_message>
Slide updated for learning plan
</commit_message>
<xml_diff>
--- a/ModernJS/JS Session 4.pptx
+++ b/ModernJS/JS Session 4.pptx
@@ -3858,7 +3858,7 @@
 <dgm:dataModel xmlns:dgm="http://schemas.openxmlformats.org/drawingml/2006/diagram" xmlns:a="http://schemas.openxmlformats.org/drawingml/2006/main">
   <dgm:ptLst>
     <dgm:pt modelId="{76C30ABF-8A6D-4F6B-95E0-421246929C1E}" type="doc">
-      <dgm:prSet loTypeId="urn:microsoft.com/office/officeart/2005/8/layout/vList2" loCatId="list" qsTypeId="urn:microsoft.com/office/officeart/2005/8/quickstyle/simple1" qsCatId="simple" csTypeId="urn:microsoft.com/office/officeart/2005/8/colors/accent1_2" csCatId="accent1"/>
+      <dgm:prSet loTypeId="urn:microsoft.com/office/officeart/2005/8/layout/vList2" loCatId="list" qsTypeId="urn:microsoft.com/office/officeart/2005/8/quickstyle/simple1" qsCatId="simple" csTypeId="urn:microsoft.com/office/officeart/2005/8/colors/accent1_2" csCatId="accent1" phldr="1"/>
       <dgm:spPr/>
       <dgm:t>
         <a:bodyPr/>
@@ -3876,10 +3876,10 @@
         <a:lstStyle/>
         <a:p>
           <a:r>
-            <a:rPr lang="en-GB"/>
-            <a:t>Plan for next 2 week</a:t>
+            <a:rPr lang="en-GB" dirty="0"/>
+            <a:t>Learning plan of next weeks</a:t>
           </a:r>
-          <a:endParaRPr lang="fr-FR"/>
+          <a:endParaRPr lang="fr-FR" dirty="0"/>
         </a:p>
       </dgm:t>
     </dgm:pt>
@@ -4471,7 +4471,7 @@
 <dgm:dataModel xmlns:dgm="http://schemas.openxmlformats.org/drawingml/2006/diagram" xmlns:a="http://schemas.openxmlformats.org/drawingml/2006/main">
   <dgm:ptLst>
     <dgm:pt modelId="{30BCAB6F-75BE-4779-802A-49303D3E5762}" type="doc">
-      <dgm:prSet loTypeId="urn:microsoft.com/office/officeart/2005/8/layout/hList1" loCatId="list" qsTypeId="urn:microsoft.com/office/officeart/2005/8/quickstyle/simple1" qsCatId="simple" csTypeId="urn:microsoft.com/office/officeart/2005/8/colors/accent1_2" csCatId="accent1"/>
+      <dgm:prSet loTypeId="urn:microsoft.com/office/officeart/2005/8/layout/hList1" loCatId="list" qsTypeId="urn:microsoft.com/office/officeart/2005/8/quickstyle/simple1" qsCatId="simple" csTypeId="urn:microsoft.com/office/officeart/2005/8/colors/accent1_2" csCatId="accent1" phldr="1"/>
       <dgm:spPr/>
       <dgm:t>
         <a:bodyPr/>
@@ -4526,10 +4526,10 @@
         <a:lstStyle/>
         <a:p>
           <a:r>
-            <a:rPr lang="en-GB"/>
-            <a:t>10 basic apps</a:t>
+            <a:rPr lang="en-GB" dirty="0"/>
+            <a:t>10 basic web-apps</a:t>
           </a:r>
-          <a:endParaRPr lang="fr-FR"/>
+          <a:endParaRPr lang="fr-FR" dirty="0"/>
         </a:p>
       </dgm:t>
     </dgm:pt>
@@ -4563,10 +4563,14 @@
         <a:lstStyle/>
         <a:p>
           <a:r>
-            <a:rPr lang="en-GB"/>
-            <a:t>Todo app</a:t>
+            <a:rPr lang="en-GB" dirty="0" err="1"/>
+            <a:t>Todo</a:t>
           </a:r>
-          <a:endParaRPr lang="fr-FR"/>
+          <a:r>
+            <a:rPr lang="en-GB" dirty="0"/>
+            <a:t> app</a:t>
+          </a:r>
+          <a:endParaRPr lang="fr-FR" dirty="0"/>
         </a:p>
       </dgm:t>
     </dgm:pt>
@@ -4600,10 +4604,10 @@
         <a:lstStyle/>
         <a:p>
           <a:r>
-            <a:rPr lang="en-GB"/>
+            <a:rPr lang="en-GB" dirty="0"/>
             <a:t>Quiz app</a:t>
           </a:r>
-          <a:endParaRPr lang="fr-FR"/>
+          <a:endParaRPr lang="fr-FR" dirty="0"/>
         </a:p>
       </dgm:t>
     </dgm:pt>
@@ -4637,10 +4641,10 @@
         <a:lstStyle/>
         <a:p>
           <a:r>
-            <a:rPr lang="en-GB"/>
+            <a:rPr lang="en-GB" dirty="0"/>
             <a:t>Notes app</a:t>
           </a:r>
-          <a:endParaRPr lang="fr-FR"/>
+          <a:endParaRPr lang="fr-FR" dirty="0"/>
         </a:p>
       </dgm:t>
     </dgm:pt>
@@ -4674,10 +4678,10 @@
         <a:lstStyle/>
         <a:p>
           <a:r>
-            <a:rPr lang="en-GB"/>
+            <a:rPr lang="en-GB" dirty="0"/>
             <a:t>Quote generator</a:t>
           </a:r>
-          <a:endParaRPr lang="fr-FR"/>
+          <a:endParaRPr lang="fr-FR" dirty="0"/>
         </a:p>
       </dgm:t>
     </dgm:pt>
@@ -4711,10 +4715,10 @@
         <a:lstStyle/>
         <a:p>
           <a:r>
-            <a:rPr lang="en-GB"/>
+            <a:rPr lang="en-GB" dirty="0"/>
             <a:t>Age calculator</a:t>
           </a:r>
-          <a:endParaRPr lang="fr-FR"/>
+          <a:endParaRPr lang="fr-FR" dirty="0"/>
         </a:p>
       </dgm:t>
     </dgm:pt>
@@ -4748,10 +4752,10 @@
         <a:lstStyle/>
         <a:p>
           <a:r>
-            <a:rPr lang="en-GB"/>
+            <a:rPr lang="en-GB" dirty="0"/>
             <a:t>Weather app</a:t>
           </a:r>
-          <a:endParaRPr lang="fr-FR"/>
+          <a:endParaRPr lang="fr-FR" dirty="0"/>
         </a:p>
       </dgm:t>
     </dgm:pt>
@@ -4785,10 +4789,14 @@
         <a:lstStyle/>
         <a:p>
           <a:r>
-            <a:rPr lang="en-GB"/>
-            <a:t>OpenAPI app</a:t>
+            <a:rPr lang="en-GB" dirty="0" err="1"/>
+            <a:t>OpenAPI</a:t>
           </a:r>
-          <a:endParaRPr lang="fr-FR"/>
+          <a:r>
+            <a:rPr lang="en-GB" dirty="0"/>
+            <a:t> AI draw app</a:t>
+          </a:r>
+          <a:endParaRPr lang="fr-FR" dirty="0"/>
         </a:p>
       </dgm:t>
     </dgm:pt>
@@ -4822,10 +4830,10 @@
         <a:lstStyle/>
         <a:p>
           <a:r>
-            <a:rPr lang="en-GB"/>
-            <a:t>More TBC</a:t>
+            <a:rPr lang="en-GB" dirty="0"/>
+            <a:t>Chrome extension</a:t>
           </a:r>
-          <a:endParaRPr lang="fr-FR"/>
+          <a:endParaRPr lang="fr-FR" dirty="0"/>
         </a:p>
       </dgm:t>
     </dgm:pt>
@@ -4915,6 +4923,80 @@
       </dgm:t>
     </dgm:pt>
     <dgm:pt modelId="{9EABD133-0A7F-4DA8-9E12-3EF584568867}" type="sibTrans" cxnId="{648FB246-59AD-4799-B027-1A0597FA0C2F}">
+      <dgm:prSet/>
+      <dgm:spPr/>
+      <dgm:t>
+        <a:bodyPr/>
+        <a:lstStyle/>
+        <a:p>
+          <a:endParaRPr lang="fr-FR"/>
+        </a:p>
+      </dgm:t>
+    </dgm:pt>
+    <dgm:pt modelId="{4DA4A92C-2A05-4013-A0A5-13CEA104548B}">
+      <dgm:prSet/>
+      <dgm:spPr/>
+      <dgm:t>
+        <a:bodyPr/>
+        <a:lstStyle/>
+        <a:p>
+          <a:r>
+            <a:rPr lang="en-GB" dirty="0"/>
+            <a:t>Password validator</a:t>
+          </a:r>
+          <a:endParaRPr lang="fr-FR" dirty="0"/>
+        </a:p>
+      </dgm:t>
+    </dgm:pt>
+    <dgm:pt modelId="{AB219E0A-B176-49C1-B7F1-E05ECEDDF102}" type="parTrans" cxnId="{83EFB1FE-48A0-4822-8A66-616CF53BAEE9}">
+      <dgm:prSet/>
+      <dgm:spPr/>
+      <dgm:t>
+        <a:bodyPr/>
+        <a:lstStyle/>
+        <a:p>
+          <a:endParaRPr lang="fr-FR"/>
+        </a:p>
+      </dgm:t>
+    </dgm:pt>
+    <dgm:pt modelId="{5695D625-4136-4797-BB04-54B956AE8EA4}" type="sibTrans" cxnId="{83EFB1FE-48A0-4822-8A66-616CF53BAEE9}">
+      <dgm:prSet/>
+      <dgm:spPr/>
+      <dgm:t>
+        <a:bodyPr/>
+        <a:lstStyle/>
+        <a:p>
+          <a:endParaRPr lang="fr-FR"/>
+        </a:p>
+      </dgm:t>
+    </dgm:pt>
+    <dgm:pt modelId="{0725BFD8-F010-4072-ACB9-445B6AF0FDAE}">
+      <dgm:prSet/>
+      <dgm:spPr/>
+      <dgm:t>
+        <a:bodyPr/>
+        <a:lstStyle/>
+        <a:p>
+          <a:r>
+            <a:rPr lang="en-GB" dirty="0"/>
+            <a:t>File uploader</a:t>
+          </a:r>
+          <a:endParaRPr lang="fr-FR" dirty="0"/>
+        </a:p>
+      </dgm:t>
+    </dgm:pt>
+    <dgm:pt modelId="{E6924031-81EC-4EEF-AB09-B780ED7C6BD7}" type="parTrans" cxnId="{D58AFBE5-19D8-44C4-9F95-7627423F4330}">
+      <dgm:prSet/>
+      <dgm:spPr/>
+      <dgm:t>
+        <a:bodyPr/>
+        <a:lstStyle/>
+        <a:p>
+          <a:endParaRPr lang="fr-FR"/>
+        </a:p>
+      </dgm:t>
+    </dgm:pt>
+    <dgm:pt modelId="{58F233AA-EDBD-41BB-91B0-48D948D9E1B5}" type="sibTrans" cxnId="{D58AFBE5-19D8-44C4-9F95-7627423F4330}">
       <dgm:prSet/>
       <dgm:spPr/>
       <dgm:t>
@@ -5016,7 +5098,8 @@
     <dgm:cxn modelId="{CF2E9717-616C-4C16-94E4-B1C109498DA0}" srcId="{9E01513E-E269-4692-9ED8-05E83E5F9A5B}" destId="{740D627E-4607-47FE-8CF1-70BEBBD83315}" srcOrd="4" destOrd="0" parTransId="{3E9BDFB3-A1EF-4B2B-905A-7D4E638856DC}" sibTransId="{E6CF06C5-E828-4FBD-9940-5FB0D8BA2EFC}"/>
     <dgm:cxn modelId="{1633E417-0760-4C52-8657-DB32A6255725}" type="presOf" srcId="{63776B04-FCCB-45E2-8F93-E904A754DE7B}" destId="{6E03D526-3929-496A-8FF7-017D0BDCADF2}" srcOrd="0" destOrd="0" presId="urn:microsoft.com/office/officeart/2005/8/layout/hList1"/>
     <dgm:cxn modelId="{1D927B1A-C90A-4A3E-A226-F197F6BA32AF}" srcId="{9E01513E-E269-4692-9ED8-05E83E5F9A5B}" destId="{311D5F38-E329-43F9-9B4E-967448DEAC49}" srcOrd="1" destOrd="0" parTransId="{CDA11D11-24CE-4812-9529-9F6AE452C713}" sibTransId="{0082039F-3268-4158-8C64-C2E73A4F2E37}"/>
-    <dgm:cxn modelId="{EEA90E35-11CB-46FC-AD97-45037FC390A3}" srcId="{9E01513E-E269-4692-9ED8-05E83E5F9A5B}" destId="{9B62AA52-53D5-4FD0-B36A-740CAF2CE505}" srcOrd="7" destOrd="0" parTransId="{1A161ADF-E421-45CD-B66B-FBDAF9410AB8}" sibTransId="{603549F5-FDA1-4D39-83D0-AA608E14522A}"/>
+    <dgm:cxn modelId="{53E1D034-DA8A-4BE3-BE56-72B43E5936DB}" type="presOf" srcId="{0725BFD8-F010-4072-ACB9-445B6AF0FDAE}" destId="{32670E83-9662-49B5-B4CD-6571F2B94065}" srcOrd="0" destOrd="10" presId="urn:microsoft.com/office/officeart/2005/8/layout/hList1"/>
+    <dgm:cxn modelId="{EEA90E35-11CB-46FC-AD97-45037FC390A3}" srcId="{9E01513E-E269-4692-9ED8-05E83E5F9A5B}" destId="{9B62AA52-53D5-4FD0-B36A-740CAF2CE505}" srcOrd="8" destOrd="0" parTransId="{1A161ADF-E421-45CD-B66B-FBDAF9410AB8}" sibTransId="{603549F5-FDA1-4D39-83D0-AA608E14522A}"/>
     <dgm:cxn modelId="{CFACB839-504C-4BA6-9ABB-98E3CA77439C}" srcId="{30BCAB6F-75BE-4779-802A-49303D3E5762}" destId="{A7E0724F-B7F0-4976-B205-CF04BB43808D}" srcOrd="0" destOrd="0" parTransId="{0A52ECBE-3311-40EA-8557-FC8B0C23E458}" sibTransId="{6AF37F7F-C8CA-4702-88CD-C55B7EEC693A}"/>
     <dgm:cxn modelId="{02D2A15F-09BA-411B-93EA-24FB70E133AF}" srcId="{A7E0724F-B7F0-4976-B205-CF04BB43808D}" destId="{9E01513E-E269-4692-9ED8-05E83E5F9A5B}" srcOrd="0" destOrd="0" parTransId="{947A26EB-B360-43EF-A4B5-0E7C62E1085F}" sibTransId="{62851F3C-8A45-45E3-8BE8-B9B3BD231F32}"/>
     <dgm:cxn modelId="{EF284C65-2754-4790-801A-4AC91E854AD6}" srcId="{9E01513E-E269-4692-9ED8-05E83E5F9A5B}" destId="{AEA26A0B-804A-4907-B5C7-089980F048BC}" srcOrd="2" destOrd="0" parTransId="{7C464FC1-27A6-44C3-8C5B-04AF38AF325C}" sibTransId="{92F01D7E-D00F-479D-B306-A1772BDC1225}"/>
@@ -5027,15 +5110,18 @@
     <dgm:cxn modelId="{BFA16F50-CCC3-4E5E-ACC5-44642C72D4BF}" type="presOf" srcId="{B5766147-6F95-49D7-9797-0EC6C6E63423}" destId="{32670E83-9662-49B5-B4CD-6571F2B94065}" srcOrd="0" destOrd="1" presId="urn:microsoft.com/office/officeart/2005/8/layout/hList1"/>
     <dgm:cxn modelId="{D23E3B73-13BC-4B08-A98E-2200AB57DEA9}" srcId="{9E01513E-E269-4692-9ED8-05E83E5F9A5B}" destId="{E18B46BD-3E5E-4D06-A5BD-8B4228B8024D}" srcOrd="5" destOrd="0" parTransId="{D98EDC08-6C7C-4BD1-BF59-F2136A77E16F}" sibTransId="{8B41C73B-CBB9-4FE9-8331-7F43FE91C47C}"/>
     <dgm:cxn modelId="{91E6F274-8D45-4041-A41E-D664B5845EA7}" srcId="{9E01513E-E269-4692-9ED8-05E83E5F9A5B}" destId="{B5766147-6F95-49D7-9797-0EC6C6E63423}" srcOrd="0" destOrd="0" parTransId="{2888C96B-AE6D-46C5-9121-8CE21D0319D0}" sibTransId="{5B25E989-FA2B-436C-8C5C-0087DCB4737E}"/>
-    <dgm:cxn modelId="{77436C5A-A1C6-4DC2-9D90-0FD18FF3512D}" type="presOf" srcId="{9B62AA52-53D5-4FD0-B36A-740CAF2CE505}" destId="{32670E83-9662-49B5-B4CD-6571F2B94065}" srcOrd="0" destOrd="8" presId="urn:microsoft.com/office/officeart/2005/8/layout/hList1"/>
+    <dgm:cxn modelId="{77436C5A-A1C6-4DC2-9D90-0FD18FF3512D}" type="presOf" srcId="{9B62AA52-53D5-4FD0-B36A-740CAF2CE505}" destId="{32670E83-9662-49B5-B4CD-6571F2B94065}" srcOrd="0" destOrd="9" presId="urn:microsoft.com/office/officeart/2005/8/layout/hList1"/>
     <dgm:cxn modelId="{7534478F-1B68-440D-B1B9-88CFE4061DE3}" type="presOf" srcId="{E18B46BD-3E5E-4D06-A5BD-8B4228B8024D}" destId="{32670E83-9662-49B5-B4CD-6571F2B94065}" srcOrd="0" destOrd="6" presId="urn:microsoft.com/office/officeart/2005/8/layout/hList1"/>
     <dgm:cxn modelId="{6013F595-16DA-46F9-A495-E463634320B0}" type="presOf" srcId="{AEA26A0B-804A-4907-B5C7-089980F048BC}" destId="{32670E83-9662-49B5-B4CD-6571F2B94065}" srcOrd="0" destOrd="3" presId="urn:microsoft.com/office/officeart/2005/8/layout/hList1"/>
     <dgm:cxn modelId="{F399B9A4-AD40-4591-979A-D3461509658F}" srcId="{30BCAB6F-75BE-4779-802A-49303D3E5762}" destId="{46DEC283-5DD3-493E-BAC6-C5FD84B77660}" srcOrd="1" destOrd="0" parTransId="{E3FD42C2-47DE-4BFD-B573-6274202DF7FA}" sibTransId="{088F86CD-9228-41BF-AE76-78550431A1B9}"/>
+    <dgm:cxn modelId="{165F1BAD-3B0A-410D-A6E4-2B2AB7D55BA5}" type="presOf" srcId="{4DA4A92C-2A05-4013-A0A5-13CEA104548B}" destId="{32670E83-9662-49B5-B4CD-6571F2B94065}" srcOrd="0" destOrd="8" presId="urn:microsoft.com/office/officeart/2005/8/layout/hList1"/>
     <dgm:cxn modelId="{AEAC63AE-AA06-46F3-8074-9D9B3E492608}" srcId="{9E01513E-E269-4692-9ED8-05E83E5F9A5B}" destId="{2BED4457-4F4B-4319-83B7-111B6426A2CF}" srcOrd="6" destOrd="0" parTransId="{86E6C403-9463-49F5-B174-6DADD4C3932D}" sibTransId="{48F2855C-98BB-444B-96A0-B72B46410936}"/>
     <dgm:cxn modelId="{9EA173B0-981C-43B4-8DDA-2BFEF86C6F67}" srcId="{9E01513E-E269-4692-9ED8-05E83E5F9A5B}" destId="{67EC8B82-E343-4C9F-B1B3-9EF381BF24A7}" srcOrd="3" destOrd="0" parTransId="{BE9646A5-3AFB-4204-BD8E-465643338DFC}" sibTransId="{EDA23477-C453-4535-8773-471312860B02}"/>
     <dgm:cxn modelId="{FD09D2C9-B7D9-47A8-A70B-9A2FBAD91D6B}" type="presOf" srcId="{2BED4457-4F4B-4319-83B7-111B6426A2CF}" destId="{32670E83-9662-49B5-B4CD-6571F2B94065}" srcOrd="0" destOrd="7" presId="urn:microsoft.com/office/officeart/2005/8/layout/hList1"/>
     <dgm:cxn modelId="{825601DD-25A4-49C3-9C0E-EDE5306D4256}" type="presOf" srcId="{311D5F38-E329-43F9-9B4E-967448DEAC49}" destId="{32670E83-9662-49B5-B4CD-6571F2B94065}" srcOrd="0" destOrd="2" presId="urn:microsoft.com/office/officeart/2005/8/layout/hList1"/>
+    <dgm:cxn modelId="{D58AFBE5-19D8-44C4-9F95-7627423F4330}" srcId="{9E01513E-E269-4692-9ED8-05E83E5F9A5B}" destId="{0725BFD8-F010-4072-ACB9-445B6AF0FDAE}" srcOrd="9" destOrd="0" parTransId="{E6924031-81EC-4EEF-AB09-B780ED7C6BD7}" sibTransId="{58F233AA-EDBD-41BB-91B0-48D948D9E1B5}"/>
     <dgm:cxn modelId="{DE2C10F3-8EB7-4BC8-8332-0AD7212FCAB9}" type="presOf" srcId="{46DEC283-5DD3-493E-BAC6-C5FD84B77660}" destId="{69264568-25DE-4FBC-83EB-BA5BB371BBD7}" srcOrd="0" destOrd="0" presId="urn:microsoft.com/office/officeart/2005/8/layout/hList1"/>
+    <dgm:cxn modelId="{83EFB1FE-48A0-4822-8A66-616CF53BAEE9}" srcId="{9E01513E-E269-4692-9ED8-05E83E5F9A5B}" destId="{4DA4A92C-2A05-4013-A0A5-13CEA104548B}" srcOrd="7" destOrd="0" parTransId="{AB219E0A-B176-49C1-B7F1-E05ECEDDF102}" sibTransId="{5695D625-4136-4797-BB04-54B956AE8EA4}"/>
     <dgm:cxn modelId="{CA0D462E-2BFE-4D5C-9492-DC58B775DE99}" type="presParOf" srcId="{A26C45ED-1B65-4BB6-A360-C3C3DFBB6C49}" destId="{63E438A9-14DF-41D9-A2FE-E911DDE43E8E}" srcOrd="0" destOrd="0" presId="urn:microsoft.com/office/officeart/2005/8/layout/hList1"/>
     <dgm:cxn modelId="{74327662-DCE2-4ECE-9F67-AD4A0E8E4897}" type="presParOf" srcId="{63E438A9-14DF-41D9-A2FE-E911DDE43E8E}" destId="{C3AA593F-DB8C-4843-997F-E65FFB4177A6}" srcOrd="0" destOrd="0" presId="urn:microsoft.com/office/officeart/2005/8/layout/hList1"/>
     <dgm:cxn modelId="{34FD041F-9872-4A9F-B990-01774024BF0D}" type="presParOf" srcId="{63E438A9-14DF-41D9-A2FE-E911DDE43E8E}" destId="{32670E83-9662-49B5-B4CD-6571F2B94065}" srcOrd="1" destOrd="0" presId="urn:microsoft.com/office/officeart/2005/8/layout/hList1"/>
@@ -5166,16 +5252,16 @@
         <a:lstStyle/>
         <a:p>
           <a:r>
-            <a:rPr lang="en-US">
+            <a:rPr lang="en-US" dirty="0">
               <a:hlinkClick xmlns:r="http://schemas.openxmlformats.org/officeDocument/2006/relationships" r:id="rId1"/>
             </a:rPr>
             <a:t>JavaScript Certification</a:t>
           </a:r>
           <a:r>
-            <a:rPr lang="en-US"/>
+            <a:rPr lang="en-US" dirty="0"/>
             <a:t> – To finish in 1 Week</a:t>
           </a:r>
-          <a:endParaRPr lang="fr-FR"/>
+          <a:endParaRPr lang="fr-FR" dirty="0"/>
         </a:p>
       </dgm:t>
     </dgm:pt>
@@ -5209,13 +5295,13 @@
         <a:lstStyle/>
         <a:p>
           <a:r>
-            <a:rPr lang="fr-FR">
+            <a:rPr lang="fr-FR" dirty="0">
               <a:hlinkClick xmlns:r="http://schemas.openxmlformats.org/officeDocument/2006/relationships" r:id="rId2"/>
             </a:rPr>
             <a:t>Front End Certification</a:t>
           </a:r>
           <a:r>
-            <a:rPr lang="fr-FR"/>
+            <a:rPr lang="fr-FR" dirty="0"/>
             <a:t> – To finish in 2 Week</a:t>
           </a:r>
         </a:p>
@@ -5251,16 +5337,16 @@
         <a:lstStyle/>
         <a:p>
           <a:r>
-            <a:rPr lang="en-US">
+            <a:rPr lang="en-US" dirty="0">
               <a:hlinkClick xmlns:r="http://schemas.openxmlformats.org/officeDocument/2006/relationships" r:id="rId3"/>
             </a:rPr>
             <a:t>Google Analytics Certification</a:t>
           </a:r>
           <a:r>
-            <a:rPr lang="en-US"/>
+            <a:rPr lang="en-US" dirty="0"/>
             <a:t> </a:t>
           </a:r>
-          <a:endParaRPr lang="fr-FR"/>
+          <a:endParaRPr lang="fr-FR" dirty="0"/>
         </a:p>
       </dgm:t>
     </dgm:pt>
@@ -5501,10 +5587,10 @@
             <a:buNone/>
           </a:pPr>
           <a:r>
-            <a:rPr lang="en-GB" sz="3000" kern="1200"/>
-            <a:t>Plan for next 2 week</a:t>
+            <a:rPr lang="en-GB" sz="3000" kern="1200" dirty="0"/>
+            <a:t>Learning plan of next weeks</a:t>
           </a:r>
-          <a:endParaRPr lang="fr-FR" sz="3000" kern="1200"/>
+          <a:endParaRPr lang="fr-FR" sz="3000" kern="1200" dirty="0"/>
         </a:p>
       </dsp:txBody>
       <dsp:txXfrm>
@@ -6289,8 +6375,8 @@
       </dsp:nvSpPr>
       <dsp:spPr>
         <a:xfrm>
-          <a:off x="3143" y="151038"/>
-          <a:ext cx="3064668" cy="695658"/>
+          <a:off x="3143" y="64262"/>
+          <a:ext cx="3064668" cy="627650"/>
         </a:xfrm>
         <a:prstGeom prst="rect">
           <a:avLst/>
@@ -6331,12 +6417,12 @@
         </a:fontRef>
       </dsp:style>
       <dsp:txBody>
-        <a:bodyPr spcFirstLastPara="0" vert="horz" wrap="square" lIns="135128" tIns="77216" rIns="135128" bIns="77216" numCol="1" spcCol="1270" anchor="ctr" anchorCtr="0">
+        <a:bodyPr spcFirstLastPara="0" vert="horz" wrap="square" lIns="120904" tIns="69088" rIns="120904" bIns="69088" numCol="1" spcCol="1270" anchor="ctr" anchorCtr="0">
           <a:noAutofit/>
         </a:bodyPr>
         <a:lstStyle/>
         <a:p>
-          <a:pPr marL="0" lvl="0" indent="0" algn="ctr" defTabSz="844550">
+          <a:pPr marL="0" lvl="0" indent="0" algn="ctr" defTabSz="755650">
             <a:lnSpc>
               <a:spcPct val="90000"/>
             </a:lnSpc>
@@ -6349,15 +6435,15 @@
             <a:buNone/>
           </a:pPr>
           <a:r>
-            <a:rPr lang="en-GB" sz="1900" kern="1200"/>
+            <a:rPr lang="en-GB" sz="1700" kern="1200"/>
             <a:t>Build with JS </a:t>
           </a:r>
-          <a:endParaRPr lang="fr-FR" sz="1900" kern="1200"/>
+          <a:endParaRPr lang="fr-FR" sz="1700" kern="1200"/>
         </a:p>
       </dsp:txBody>
       <dsp:txXfrm>
-        <a:off x="3143" y="151038"/>
-        <a:ext cx="3064668" cy="695658"/>
+        <a:off x="3143" y="64262"/>
+        <a:ext cx="3064668" cy="627650"/>
       </dsp:txXfrm>
     </dsp:sp>
     <dsp:sp modelId="{32670E83-9662-49B5-B4CD-6571F2B94065}">
@@ -6367,8 +6453,8 @@
       </dsp:nvSpPr>
       <dsp:spPr>
         <a:xfrm>
-          <a:off x="3143" y="846696"/>
-          <a:ext cx="3064668" cy="3024990"/>
+          <a:off x="3143" y="691912"/>
+          <a:ext cx="3064668" cy="3266550"/>
         </a:xfrm>
         <a:prstGeom prst="rect">
           <a:avLst/>
@@ -6411,12 +6497,12 @@
         <a:fontRef idx="minor"/>
       </dsp:style>
       <dsp:txBody>
-        <a:bodyPr spcFirstLastPara="0" vert="horz" wrap="square" lIns="101346" tIns="101346" rIns="135128" bIns="152019" numCol="1" spcCol="1270" anchor="t" anchorCtr="0">
+        <a:bodyPr spcFirstLastPara="0" vert="horz" wrap="square" lIns="90678" tIns="90678" rIns="120904" bIns="136017" numCol="1" spcCol="1270" anchor="t" anchorCtr="0">
           <a:noAutofit/>
         </a:bodyPr>
         <a:lstStyle/>
         <a:p>
-          <a:pPr marL="171450" lvl="1" indent="-171450" algn="l" defTabSz="844550">
+          <a:pPr marL="171450" lvl="1" indent="-171450" algn="l" defTabSz="755650">
             <a:lnSpc>
               <a:spcPct val="90000"/>
             </a:lnSpc>
@@ -6429,13 +6515,13 @@
             <a:buChar char="•"/>
           </a:pPr>
           <a:r>
-            <a:rPr lang="en-GB" sz="1900" kern="1200"/>
-            <a:t>10 basic apps</a:t>
+            <a:rPr lang="en-GB" sz="1700" kern="1200" dirty="0"/>
+            <a:t>10 basic web-apps</a:t>
           </a:r>
-          <a:endParaRPr lang="fr-FR" sz="1900" kern="1200"/>
+          <a:endParaRPr lang="fr-FR" sz="1700" kern="1200" dirty="0"/>
         </a:p>
         <a:p>
-          <a:pPr marL="342900" lvl="2" indent="-171450" algn="l" defTabSz="844550">
+          <a:pPr marL="342900" lvl="2" indent="-171450" algn="l" defTabSz="755650">
             <a:lnSpc>
               <a:spcPct val="90000"/>
             </a:lnSpc>
@@ -6448,13 +6534,17 @@
             <a:buChar char="•"/>
           </a:pPr>
           <a:r>
-            <a:rPr lang="en-GB" sz="1900" kern="1200"/>
-            <a:t>Todo app</a:t>
+            <a:rPr lang="en-GB" sz="1700" kern="1200" dirty="0" err="1"/>
+            <a:t>Todo</a:t>
           </a:r>
-          <a:endParaRPr lang="fr-FR" sz="1900" kern="1200"/>
+          <a:r>
+            <a:rPr lang="en-GB" sz="1700" kern="1200" dirty="0"/>
+            <a:t> app</a:t>
+          </a:r>
+          <a:endParaRPr lang="fr-FR" sz="1700" kern="1200" dirty="0"/>
         </a:p>
         <a:p>
-          <a:pPr marL="342900" lvl="2" indent="-171450" algn="l" defTabSz="844550">
+          <a:pPr marL="342900" lvl="2" indent="-171450" algn="l" defTabSz="755650">
             <a:lnSpc>
               <a:spcPct val="90000"/>
             </a:lnSpc>
@@ -6467,13 +6557,13 @@
             <a:buChar char="•"/>
           </a:pPr>
           <a:r>
-            <a:rPr lang="en-GB" sz="1900" kern="1200"/>
+            <a:rPr lang="en-GB" sz="1700" kern="1200" dirty="0"/>
             <a:t>Quiz app</a:t>
           </a:r>
-          <a:endParaRPr lang="fr-FR" sz="1900" kern="1200"/>
+          <a:endParaRPr lang="fr-FR" sz="1700" kern="1200" dirty="0"/>
         </a:p>
         <a:p>
-          <a:pPr marL="342900" lvl="2" indent="-171450" algn="l" defTabSz="844550">
+          <a:pPr marL="342900" lvl="2" indent="-171450" algn="l" defTabSz="755650">
             <a:lnSpc>
               <a:spcPct val="90000"/>
             </a:lnSpc>
@@ -6486,13 +6576,13 @@
             <a:buChar char="•"/>
           </a:pPr>
           <a:r>
-            <a:rPr lang="en-GB" sz="1900" kern="1200"/>
+            <a:rPr lang="en-GB" sz="1700" kern="1200" dirty="0"/>
             <a:t>Notes app</a:t>
           </a:r>
-          <a:endParaRPr lang="fr-FR" sz="1900" kern="1200"/>
+          <a:endParaRPr lang="fr-FR" sz="1700" kern="1200" dirty="0"/>
         </a:p>
         <a:p>
-          <a:pPr marL="342900" lvl="2" indent="-171450" algn="l" defTabSz="844550">
+          <a:pPr marL="342900" lvl="2" indent="-171450" algn="l" defTabSz="755650">
             <a:lnSpc>
               <a:spcPct val="90000"/>
             </a:lnSpc>
@@ -6505,13 +6595,13 @@
             <a:buChar char="•"/>
           </a:pPr>
           <a:r>
-            <a:rPr lang="en-GB" sz="1900" kern="1200"/>
+            <a:rPr lang="en-GB" sz="1700" kern="1200" dirty="0"/>
             <a:t>Quote generator</a:t>
           </a:r>
-          <a:endParaRPr lang="fr-FR" sz="1900" kern="1200"/>
+          <a:endParaRPr lang="fr-FR" sz="1700" kern="1200" dirty="0"/>
         </a:p>
         <a:p>
-          <a:pPr marL="342900" lvl="2" indent="-171450" algn="l" defTabSz="844550">
+          <a:pPr marL="342900" lvl="2" indent="-171450" algn="l" defTabSz="755650">
             <a:lnSpc>
               <a:spcPct val="90000"/>
             </a:lnSpc>
@@ -6524,13 +6614,13 @@
             <a:buChar char="•"/>
           </a:pPr>
           <a:r>
-            <a:rPr lang="en-GB" sz="1900" kern="1200"/>
+            <a:rPr lang="en-GB" sz="1700" kern="1200" dirty="0"/>
             <a:t>Age calculator</a:t>
           </a:r>
-          <a:endParaRPr lang="fr-FR" sz="1900" kern="1200"/>
+          <a:endParaRPr lang="fr-FR" sz="1700" kern="1200" dirty="0"/>
         </a:p>
         <a:p>
-          <a:pPr marL="342900" lvl="2" indent="-171450" algn="l" defTabSz="844550">
+          <a:pPr marL="342900" lvl="2" indent="-171450" algn="l" defTabSz="755650">
             <a:lnSpc>
               <a:spcPct val="90000"/>
             </a:lnSpc>
@@ -6543,13 +6633,13 @@
             <a:buChar char="•"/>
           </a:pPr>
           <a:r>
-            <a:rPr lang="en-GB" sz="1900" kern="1200"/>
+            <a:rPr lang="en-GB" sz="1700" kern="1200" dirty="0"/>
             <a:t>Weather app</a:t>
           </a:r>
-          <a:endParaRPr lang="fr-FR" sz="1900" kern="1200"/>
+          <a:endParaRPr lang="fr-FR" sz="1700" kern="1200" dirty="0"/>
         </a:p>
         <a:p>
-          <a:pPr marL="342900" lvl="2" indent="-171450" algn="l" defTabSz="844550">
+          <a:pPr marL="342900" lvl="2" indent="-171450" algn="l" defTabSz="755650">
             <a:lnSpc>
               <a:spcPct val="90000"/>
             </a:lnSpc>
@@ -6562,13 +6652,17 @@
             <a:buChar char="•"/>
           </a:pPr>
           <a:r>
-            <a:rPr lang="en-GB" sz="1900" kern="1200"/>
-            <a:t>OpenAPI app</a:t>
+            <a:rPr lang="en-GB" sz="1700" kern="1200" dirty="0" err="1"/>
+            <a:t>OpenAPI</a:t>
           </a:r>
-          <a:endParaRPr lang="fr-FR" sz="1900" kern="1200"/>
+          <a:r>
+            <a:rPr lang="en-GB" sz="1700" kern="1200" dirty="0"/>
+            <a:t> AI draw app</a:t>
+          </a:r>
+          <a:endParaRPr lang="fr-FR" sz="1700" kern="1200" dirty="0"/>
         </a:p>
         <a:p>
-          <a:pPr marL="342900" lvl="2" indent="-171450" algn="l" defTabSz="844550">
+          <a:pPr marL="342900" lvl="2" indent="-171450" algn="l" defTabSz="755650">
             <a:lnSpc>
               <a:spcPct val="90000"/>
             </a:lnSpc>
@@ -6581,15 +6675,53 @@
             <a:buChar char="•"/>
           </a:pPr>
           <a:r>
-            <a:rPr lang="en-GB" sz="1900" kern="1200"/>
-            <a:t>More TBC</a:t>
+            <a:rPr lang="en-GB" sz="1700" kern="1200" dirty="0"/>
+            <a:t>Password validator</a:t>
           </a:r>
-          <a:endParaRPr lang="fr-FR" sz="1900" kern="1200"/>
+          <a:endParaRPr lang="fr-FR" sz="1700" kern="1200" dirty="0"/>
+        </a:p>
+        <a:p>
+          <a:pPr marL="342900" lvl="2" indent="-171450" algn="l" defTabSz="755650">
+            <a:lnSpc>
+              <a:spcPct val="90000"/>
+            </a:lnSpc>
+            <a:spcBef>
+              <a:spcPct val="0"/>
+            </a:spcBef>
+            <a:spcAft>
+              <a:spcPct val="15000"/>
+            </a:spcAft>
+            <a:buChar char="•"/>
+          </a:pPr>
+          <a:r>
+            <a:rPr lang="en-GB" sz="1700" kern="1200" dirty="0"/>
+            <a:t>Chrome extension</a:t>
+          </a:r>
+          <a:endParaRPr lang="fr-FR" sz="1700" kern="1200" dirty="0"/>
+        </a:p>
+        <a:p>
+          <a:pPr marL="342900" lvl="2" indent="-171450" algn="l" defTabSz="755650">
+            <a:lnSpc>
+              <a:spcPct val="90000"/>
+            </a:lnSpc>
+            <a:spcBef>
+              <a:spcPct val="0"/>
+            </a:spcBef>
+            <a:spcAft>
+              <a:spcPct val="15000"/>
+            </a:spcAft>
+            <a:buChar char="•"/>
+          </a:pPr>
+          <a:r>
+            <a:rPr lang="en-GB" sz="1700" kern="1200" dirty="0"/>
+            <a:t>File uploader</a:t>
+          </a:r>
+          <a:endParaRPr lang="fr-FR" sz="1700" kern="1200" dirty="0"/>
         </a:p>
       </dsp:txBody>
       <dsp:txXfrm>
-        <a:off x="3143" y="846696"/>
-        <a:ext cx="3064668" cy="3024990"/>
+        <a:off x="3143" y="691912"/>
+        <a:ext cx="3064668" cy="3266550"/>
       </dsp:txXfrm>
     </dsp:sp>
     <dsp:sp modelId="{69264568-25DE-4FBC-83EB-BA5BB371BBD7}">
@@ -6599,8 +6731,8 @@
       </dsp:nvSpPr>
       <dsp:spPr>
         <a:xfrm>
-          <a:off x="3496865" y="151038"/>
-          <a:ext cx="3064668" cy="695658"/>
+          <a:off x="3496865" y="64262"/>
+          <a:ext cx="3064668" cy="627650"/>
         </a:xfrm>
         <a:prstGeom prst="rect">
           <a:avLst/>
@@ -6641,12 +6773,12 @@
         </a:fontRef>
       </dsp:style>
       <dsp:txBody>
-        <a:bodyPr spcFirstLastPara="0" vert="horz" wrap="square" lIns="135128" tIns="77216" rIns="135128" bIns="77216" numCol="1" spcCol="1270" anchor="ctr" anchorCtr="0">
+        <a:bodyPr spcFirstLastPara="0" vert="horz" wrap="square" lIns="120904" tIns="69088" rIns="120904" bIns="69088" numCol="1" spcCol="1270" anchor="ctr" anchorCtr="0">
           <a:noAutofit/>
         </a:bodyPr>
         <a:lstStyle/>
         <a:p>
-          <a:pPr marL="0" lvl="0" indent="0" algn="ctr" defTabSz="844550">
+          <a:pPr marL="0" lvl="0" indent="0" algn="ctr" defTabSz="755650">
             <a:lnSpc>
               <a:spcPct val="90000"/>
             </a:lnSpc>
@@ -6659,15 +6791,15 @@
             <a:buNone/>
           </a:pPr>
           <a:r>
-            <a:rPr lang="en-GB" sz="1900" kern="1200"/>
+            <a:rPr lang="en-GB" sz="1700" kern="1200"/>
             <a:t>Build an e-commerce App with React and .Net Core</a:t>
           </a:r>
-          <a:endParaRPr lang="fr-FR" sz="1900" kern="1200"/>
+          <a:endParaRPr lang="fr-FR" sz="1700" kern="1200"/>
         </a:p>
       </dsp:txBody>
       <dsp:txXfrm>
-        <a:off x="3496865" y="151038"/>
-        <a:ext cx="3064668" cy="695658"/>
+        <a:off x="3496865" y="64262"/>
+        <a:ext cx="3064668" cy="627650"/>
       </dsp:txXfrm>
     </dsp:sp>
     <dsp:sp modelId="{4C940545-B29E-48DD-96D4-C121753F1DFD}">
@@ -6677,8 +6809,8 @@
       </dsp:nvSpPr>
       <dsp:spPr>
         <a:xfrm>
-          <a:off x="3496865" y="846696"/>
-          <a:ext cx="3064668" cy="3024990"/>
+          <a:off x="3496865" y="691912"/>
+          <a:ext cx="3064668" cy="3266550"/>
         </a:xfrm>
         <a:prstGeom prst="rect">
           <a:avLst/>
@@ -6728,8 +6860,8 @@
       </dsp:nvSpPr>
       <dsp:spPr>
         <a:xfrm>
-          <a:off x="6990588" y="151038"/>
-          <a:ext cx="3064668" cy="695658"/>
+          <a:off x="6990588" y="64262"/>
+          <a:ext cx="3064668" cy="627650"/>
         </a:xfrm>
         <a:prstGeom prst="rect">
           <a:avLst/>
@@ -6770,12 +6902,12 @@
         </a:fontRef>
       </dsp:style>
       <dsp:txBody>
-        <a:bodyPr spcFirstLastPara="0" vert="horz" wrap="square" lIns="135128" tIns="77216" rIns="135128" bIns="77216" numCol="1" spcCol="1270" anchor="ctr" anchorCtr="0">
+        <a:bodyPr spcFirstLastPara="0" vert="horz" wrap="square" lIns="120904" tIns="69088" rIns="120904" bIns="69088" numCol="1" spcCol="1270" anchor="ctr" anchorCtr="0">
           <a:noAutofit/>
         </a:bodyPr>
         <a:lstStyle/>
         <a:p>
-          <a:pPr marL="0" lvl="0" indent="0" algn="ctr" defTabSz="844550">
+          <a:pPr marL="0" lvl="0" indent="0" algn="ctr" defTabSz="755650">
             <a:lnSpc>
               <a:spcPct val="90000"/>
             </a:lnSpc>
@@ -6788,15 +6920,15 @@
             <a:buNone/>
           </a:pPr>
           <a:r>
-            <a:rPr lang="en-GB" sz="1900" kern="1200"/>
+            <a:rPr lang="en-GB" sz="1700" kern="1200"/>
             <a:t>Build your portfolio website with Three.js and React</a:t>
           </a:r>
-          <a:endParaRPr lang="fr-FR" sz="1900" kern="1200"/>
+          <a:endParaRPr lang="fr-FR" sz="1700" kern="1200"/>
         </a:p>
       </dsp:txBody>
       <dsp:txXfrm>
-        <a:off x="6990588" y="151038"/>
-        <a:ext cx="3064668" cy="695658"/>
+        <a:off x="6990588" y="64262"/>
+        <a:ext cx="3064668" cy="627650"/>
       </dsp:txXfrm>
     </dsp:sp>
     <dsp:sp modelId="{40554C20-8885-4973-8687-6892D7818CDC}">
@@ -6806,8 +6938,8 @@
       </dsp:nvSpPr>
       <dsp:spPr>
         <a:xfrm>
-          <a:off x="6990588" y="846696"/>
-          <a:ext cx="3064668" cy="3024990"/>
+          <a:off x="6990588" y="691912"/>
+          <a:ext cx="3064668" cy="3266550"/>
         </a:xfrm>
         <a:prstGeom prst="rect">
           <a:avLst/>
@@ -7067,16 +7199,16 @@
             <a:buNone/>
           </a:pPr>
           <a:r>
-            <a:rPr lang="en-US" sz="1800" kern="1200">
+            <a:rPr lang="en-US" sz="1800" kern="1200" dirty="0">
               <a:hlinkClick xmlns:r="http://schemas.openxmlformats.org/officeDocument/2006/relationships" r:id="rId1"/>
             </a:rPr>
             <a:t>JavaScript Certification</a:t>
           </a:r>
           <a:r>
-            <a:rPr lang="en-US" sz="1800" kern="1200"/>
+            <a:rPr lang="en-US" sz="1800" kern="1200" dirty="0"/>
             <a:t> – To finish in 1 Week</a:t>
           </a:r>
-          <a:endParaRPr lang="fr-FR" sz="1800" kern="1200"/>
+          <a:endParaRPr lang="fr-FR" sz="1800" kern="1200" dirty="0"/>
         </a:p>
       </dsp:txBody>
       <dsp:txXfrm>
@@ -7150,13 +7282,13 @@
             <a:buNone/>
           </a:pPr>
           <a:r>
-            <a:rPr lang="fr-FR" sz="1800" kern="1200">
+            <a:rPr lang="fr-FR" sz="1800" kern="1200" dirty="0">
               <a:hlinkClick xmlns:r="http://schemas.openxmlformats.org/officeDocument/2006/relationships" r:id="rId2"/>
             </a:rPr>
             <a:t>Front End Certification</a:t>
           </a:r>
           <a:r>
-            <a:rPr lang="fr-FR" sz="1800" kern="1200"/>
+            <a:rPr lang="fr-FR" sz="1800" kern="1200" dirty="0"/>
             <a:t> – To finish in 2 Week</a:t>
           </a:r>
         </a:p>
@@ -7232,16 +7364,16 @@
             <a:buNone/>
           </a:pPr>
           <a:r>
-            <a:rPr lang="en-US" sz="1800" kern="1200">
+            <a:rPr lang="en-US" sz="1800" kern="1200" dirty="0">
               <a:hlinkClick xmlns:r="http://schemas.openxmlformats.org/officeDocument/2006/relationships" r:id="rId3"/>
             </a:rPr>
             <a:t>Google Analytics Certification</a:t>
           </a:r>
           <a:r>
-            <a:rPr lang="en-US" sz="1800" kern="1200"/>
+            <a:rPr lang="en-US" sz="1800" kern="1200" dirty="0"/>
             <a:t> </a:t>
           </a:r>
-          <a:endParaRPr lang="fr-FR" sz="1800" kern="1200"/>
+          <a:endParaRPr lang="fr-FR" sz="1800" kern="1200" dirty="0"/>
         </a:p>
       </dsp:txBody>
       <dsp:txXfrm>
@@ -17223,7 +17355,7 @@
             <p:ph idx="1"/>
             <p:extLst>
               <p:ext uri="{D42A27DB-BD31-4B8C-83A1-F6EECF244321}">
-                <p14:modId xmlns:p14="http://schemas.microsoft.com/office/powerpoint/2010/main" val="1881270686"/>
+                <p14:modId xmlns:p14="http://schemas.microsoft.com/office/powerpoint/2010/main" val="4081903132"/>
               </p:ext>
             </p:extLst>
           </p:nvPr>
@@ -17493,7 +17625,7 @@
             <p:ph idx="1"/>
             <p:extLst>
               <p:ext uri="{D42A27DB-BD31-4B8C-83A1-F6EECF244321}">
-                <p14:modId xmlns:p14="http://schemas.microsoft.com/office/powerpoint/2010/main" val="647703496"/>
+                <p14:modId xmlns:p14="http://schemas.microsoft.com/office/powerpoint/2010/main" val="1411301457"/>
               </p:ext>
             </p:extLst>
           </p:nvPr>

</xml_diff>

<commit_message>
Slides for basic Notes API project
</commit_message>
<xml_diff>
--- a/ModernJS/JS Session 4.pptx
+++ b/ModernJS/JS Session 4.pptx
@@ -4563,14 +4563,14 @@
         <a:lstStyle/>
         <a:p>
           <a:r>
-            <a:rPr lang="en-GB" dirty="0" err="1"/>
+            <a:rPr lang="en-GB" u="sng" dirty="0" err="1"/>
             <a:t>Todo</a:t>
           </a:r>
           <a:r>
-            <a:rPr lang="en-GB" dirty="0"/>
+            <a:rPr lang="en-GB" u="sng" dirty="0"/>
             <a:t> app</a:t>
           </a:r>
-          <a:endParaRPr lang="fr-FR" dirty="0"/>
+          <a:endParaRPr lang="fr-FR" u="sng" dirty="0"/>
         </a:p>
       </dgm:t>
     </dgm:pt>
@@ -4604,10 +4604,10 @@
         <a:lstStyle/>
         <a:p>
           <a:r>
-            <a:rPr lang="en-GB" dirty="0"/>
+            <a:rPr lang="en-GB" u="sng" dirty="0"/>
             <a:t>Quiz app</a:t>
           </a:r>
-          <a:endParaRPr lang="fr-FR" dirty="0"/>
+          <a:endParaRPr lang="fr-FR" u="sng" dirty="0"/>
         </a:p>
       </dgm:t>
     </dgm:pt>
@@ -4641,10 +4641,10 @@
         <a:lstStyle/>
         <a:p>
           <a:r>
-            <a:rPr lang="en-GB" dirty="0"/>
+            <a:rPr lang="en-GB" u="sng" dirty="0"/>
             <a:t>Notes app</a:t>
           </a:r>
-          <a:endParaRPr lang="fr-FR" dirty="0"/>
+          <a:endParaRPr lang="fr-FR" u="sng" dirty="0"/>
         </a:p>
       </dgm:t>
     </dgm:pt>
@@ -4678,10 +4678,10 @@
         <a:lstStyle/>
         <a:p>
           <a:r>
-            <a:rPr lang="en-GB" dirty="0"/>
+            <a:rPr lang="en-GB" i="0" u="sng" dirty="0"/>
             <a:t>Quote generator</a:t>
           </a:r>
-          <a:endParaRPr lang="fr-FR" dirty="0"/>
+          <a:endParaRPr lang="fr-FR" i="0" u="sng" dirty="0"/>
         </a:p>
       </dgm:t>
     </dgm:pt>
@@ -4715,10 +4715,10 @@
         <a:lstStyle/>
         <a:p>
           <a:r>
-            <a:rPr lang="en-GB" dirty="0"/>
+            <a:rPr lang="en-GB" u="sng" dirty="0"/>
             <a:t>Age calculator</a:t>
           </a:r>
-          <a:endParaRPr lang="fr-FR" dirty="0"/>
+          <a:endParaRPr lang="fr-FR" u="sng" dirty="0"/>
         </a:p>
       </dgm:t>
     </dgm:pt>
@@ -4755,7 +4755,7 @@
             <a:rPr lang="en-GB" dirty="0"/>
             <a:t>Weather app</a:t>
           </a:r>
-          <a:endParaRPr lang="fr-FR" dirty="0"/>
+          <a:endParaRPr lang="fr-FR" u="sng" dirty="0"/>
         </a:p>
       </dgm:t>
     </dgm:pt>
@@ -4789,14 +4789,14 @@
         <a:lstStyle/>
         <a:p>
           <a:r>
-            <a:rPr lang="en-GB" dirty="0" err="1"/>
+            <a:rPr lang="en-GB" u="sng" dirty="0" err="1"/>
             <a:t>OpenAPI</a:t>
           </a:r>
           <a:r>
-            <a:rPr lang="en-GB" dirty="0"/>
+            <a:rPr lang="en-GB" u="sng" dirty="0"/>
             <a:t> AI draw app</a:t>
           </a:r>
-          <a:endParaRPr lang="fr-FR" dirty="0"/>
+          <a:endParaRPr lang="fr-FR" u="sng" dirty="0"/>
         </a:p>
       </dgm:t>
     </dgm:pt>
@@ -4830,10 +4830,10 @@
         <a:lstStyle/>
         <a:p>
           <a:r>
-            <a:rPr lang="en-GB" dirty="0"/>
+            <a:rPr lang="en-GB" u="sng" dirty="0"/>
             <a:t>Chrome extension</a:t>
           </a:r>
-          <a:endParaRPr lang="fr-FR" dirty="0"/>
+          <a:endParaRPr lang="fr-FR" u="sng" dirty="0"/>
         </a:p>
       </dgm:t>
     </dgm:pt>
@@ -4949,10 +4949,10 @@
         <a:lstStyle/>
         <a:p>
           <a:r>
-            <a:rPr lang="en-GB" dirty="0"/>
+            <a:rPr lang="en-GB" u="sng" dirty="0"/>
             <a:t>Password validator</a:t>
           </a:r>
-          <a:endParaRPr lang="fr-FR" dirty="0"/>
+          <a:endParaRPr lang="fr-FR" u="sng" dirty="0"/>
         </a:p>
       </dgm:t>
     </dgm:pt>
@@ -4986,10 +4986,10 @@
         <a:lstStyle/>
         <a:p>
           <a:r>
-            <a:rPr lang="en-GB" dirty="0"/>
+            <a:rPr lang="en-GB" u="sng" dirty="0"/>
             <a:t>File uploader</a:t>
           </a:r>
-          <a:endParaRPr lang="fr-FR" dirty="0"/>
+          <a:endParaRPr lang="fr-FR" u="sng" dirty="0"/>
         </a:p>
       </dgm:t>
     </dgm:pt>
@@ -5430,6 +5430,43 @@
         </a:p>
       </dgm:t>
     </dgm:pt>
+    <dgm:pt modelId="{2BF605B4-1388-4EA1-A0AC-5961E65B4EEC}">
+      <dgm:prSet/>
+      <dgm:spPr/>
+      <dgm:t>
+        <a:bodyPr/>
+        <a:lstStyle/>
+        <a:p>
+          <a:r>
+            <a:rPr lang="en-GB" dirty="0"/>
+            <a:t>Notes app API</a:t>
+          </a:r>
+          <a:endParaRPr lang="fr-FR" dirty="0"/>
+        </a:p>
+      </dgm:t>
+    </dgm:pt>
+    <dgm:pt modelId="{F85AA14B-FDAB-43C9-B7C8-305A693F9C70}" type="parTrans" cxnId="{BD7FA16B-5BE6-48B2-9FA6-57C2C1E344A5}">
+      <dgm:prSet/>
+      <dgm:spPr/>
+      <dgm:t>
+        <a:bodyPr/>
+        <a:lstStyle/>
+        <a:p>
+          <a:endParaRPr lang="fr-FR"/>
+        </a:p>
+      </dgm:t>
+    </dgm:pt>
+    <dgm:pt modelId="{979581BA-1429-4C4B-848F-EDFA96E0AA4C}" type="sibTrans" cxnId="{BD7FA16B-5BE6-48B2-9FA6-57C2C1E344A5}">
+      <dgm:prSet/>
+      <dgm:spPr/>
+      <dgm:t>
+        <a:bodyPr/>
+        <a:lstStyle/>
+        <a:p>
+          <a:endParaRPr lang="fr-FR"/>
+        </a:p>
+      </dgm:t>
+    </dgm:pt>
     <dgm:pt modelId="{A26C45ED-1B65-4BB6-A360-C3C3DFBB6C49}" type="pres">
       <dgm:prSet presAssocID="{30BCAB6F-75BE-4779-802A-49303D3E5762}" presName="Name0" presStyleCnt="0">
         <dgm:presLayoutVars>
@@ -5545,7 +5582,7 @@
     <dgm:cxn modelId="{DC27C309-CC4E-4C71-B759-61A3D41D4443}" type="presOf" srcId="{67EC8B82-E343-4C9F-B1B3-9EF381BF24A7}" destId="{32670E83-9662-49B5-B4CD-6571F2B94065}" srcOrd="0" destOrd="4" presId="urn:microsoft.com/office/officeart/2005/8/layout/hList1"/>
     <dgm:cxn modelId="{382D010A-1F8E-4986-987F-C731D7B39970}" type="presOf" srcId="{9AA99167-3C3A-4773-9E93-C36B67B23851}" destId="{7211202F-3508-455D-AA5D-8BFED9D7979C}" srcOrd="0" destOrd="3" presId="urn:microsoft.com/office/officeart/2005/8/layout/hList1"/>
     <dgm:cxn modelId="{EDEEC715-EF27-4B7D-AC67-48B4BBB40E8B}" type="presOf" srcId="{A7E0724F-B7F0-4976-B205-CF04BB43808D}" destId="{C3AA593F-DB8C-4843-997F-E65FFB4177A6}" srcOrd="0" destOrd="0" presId="urn:microsoft.com/office/officeart/2005/8/layout/hList1"/>
-    <dgm:cxn modelId="{75669416-1B6A-4E48-A689-F2ED143012F2}" srcId="{84E18807-37B4-4C7B-A8EA-5E677CC9FFE6}" destId="{E224C2D2-557F-4D35-9E96-48F67CC78AC5}" srcOrd="8" destOrd="0" parTransId="{A76AF9CA-A5F4-470F-A2C0-36B8695D1320}" sibTransId="{26157658-586A-41BA-9BB3-C301E35A5612}"/>
+    <dgm:cxn modelId="{75669416-1B6A-4E48-A689-F2ED143012F2}" srcId="{84E18807-37B4-4C7B-A8EA-5E677CC9FFE6}" destId="{E224C2D2-557F-4D35-9E96-48F67CC78AC5}" srcOrd="9" destOrd="0" parTransId="{A76AF9CA-A5F4-470F-A2C0-36B8695D1320}" sibTransId="{26157658-586A-41BA-9BB3-C301E35A5612}"/>
     <dgm:cxn modelId="{CF2E9717-616C-4C16-94E4-B1C109498DA0}" srcId="{9E01513E-E269-4692-9ED8-05E83E5F9A5B}" destId="{740D627E-4607-47FE-8CF1-70BEBBD83315}" srcOrd="4" destOrd="0" parTransId="{3E9BDFB3-A1EF-4B2B-905A-7D4E638856DC}" sibTransId="{E6CF06C5-E828-4FBD-9940-5FB0D8BA2EFC}"/>
     <dgm:cxn modelId="{1633E417-0760-4C52-8657-DB32A6255725}" type="presOf" srcId="{63776B04-FCCB-45E2-8F93-E904A754DE7B}" destId="{6E03D526-3929-496A-8FF7-017D0BDCADF2}" srcOrd="0" destOrd="0" presId="urn:microsoft.com/office/officeart/2005/8/layout/hList1"/>
     <dgm:cxn modelId="{C96CDC19-C71D-472A-90C4-2D6B8C053FE6}" type="presOf" srcId="{1CE12644-094A-4EF5-B7D4-C75E4F31FD28}" destId="{7211202F-3508-455D-AA5D-8BFED9D7979C}" srcOrd="0" destOrd="5" presId="urn:microsoft.com/office/officeart/2005/8/layout/hList1"/>
@@ -5564,6 +5601,7 @@
     <dgm:cxn modelId="{AAB05169-375F-4166-9C57-33A4FE264F21}" type="presOf" srcId="{84E18807-37B4-4C7B-A8EA-5E677CC9FFE6}" destId="{7211202F-3508-455D-AA5D-8BFED9D7979C}" srcOrd="0" destOrd="0" presId="urn:microsoft.com/office/officeart/2005/8/layout/hList1"/>
     <dgm:cxn modelId="{4B91A949-3B9F-4E85-892E-037D19B4339A}" type="presOf" srcId="{9E01513E-E269-4692-9ED8-05E83E5F9A5B}" destId="{32670E83-9662-49B5-B4CD-6571F2B94065}" srcOrd="0" destOrd="0" presId="urn:microsoft.com/office/officeart/2005/8/layout/hList1"/>
     <dgm:cxn modelId="{453FE249-7982-4438-BC40-E5B5DA221603}" type="presOf" srcId="{30BCAB6F-75BE-4779-802A-49303D3E5762}" destId="{A26C45ED-1B65-4BB6-A360-C3C3DFBB6C49}" srcOrd="0" destOrd="0" presId="urn:microsoft.com/office/officeart/2005/8/layout/hList1"/>
+    <dgm:cxn modelId="{BD7FA16B-5BE6-48B2-9FA6-57C2C1E344A5}" srcId="{84E18807-37B4-4C7B-A8EA-5E677CC9FFE6}" destId="{2BF605B4-1388-4EA1-A0AC-5961E65B4EEC}" srcOrd="8" destOrd="0" parTransId="{F85AA14B-FDAB-43C9-B7C8-305A693F9C70}" sibTransId="{979581BA-1429-4C4B-848F-EDFA96E0AA4C}"/>
     <dgm:cxn modelId="{FCF4354E-DFDA-4786-9280-C5D563FDA09F}" type="presOf" srcId="{FD2BB005-40E6-42F1-904A-3CE6E447C6EB}" destId="{7211202F-3508-455D-AA5D-8BFED9D7979C}" srcOrd="0" destOrd="1" presId="urn:microsoft.com/office/officeart/2005/8/layout/hList1"/>
     <dgm:cxn modelId="{BFA16F50-CCC3-4E5E-ACC5-44642C72D4BF}" type="presOf" srcId="{B5766147-6F95-49D7-9797-0EC6C6E63423}" destId="{32670E83-9662-49B5-B4CD-6571F2B94065}" srcOrd="0" destOrd="1" presId="urn:microsoft.com/office/officeart/2005/8/layout/hList1"/>
     <dgm:cxn modelId="{D23E3B73-13BC-4B08-A98E-2200AB57DEA9}" srcId="{9E01513E-E269-4692-9ED8-05E83E5F9A5B}" destId="{E18B46BD-3E5E-4D06-A5BD-8B4228B8024D}" srcOrd="5" destOrd="0" parTransId="{D98EDC08-6C7C-4BD1-BF59-F2136A77E16F}" sibTransId="{8B41C73B-CBB9-4FE9-8331-7F43FE91C47C}"/>
@@ -5577,11 +5615,12 @@
     <dgm:cxn modelId="{6013F595-16DA-46F9-A495-E463634320B0}" type="presOf" srcId="{AEA26A0B-804A-4907-B5C7-089980F048BC}" destId="{32670E83-9662-49B5-B4CD-6571F2B94065}" srcOrd="0" destOrd="3" presId="urn:microsoft.com/office/officeart/2005/8/layout/hList1"/>
     <dgm:cxn modelId="{F399B9A4-AD40-4591-979A-D3461509658F}" srcId="{30BCAB6F-75BE-4779-802A-49303D3E5762}" destId="{46DEC283-5DD3-493E-BAC6-C5FD84B77660}" srcOrd="2" destOrd="0" parTransId="{E3FD42C2-47DE-4BFD-B573-6274202DF7FA}" sibTransId="{088F86CD-9228-41BF-AE76-78550431A1B9}"/>
     <dgm:cxn modelId="{5DC73BA7-3F39-4FE3-AF90-83395B68A7DF}" type="presOf" srcId="{B4F21450-DF84-4335-AF2B-2883925A4B44}" destId="{7211202F-3508-455D-AA5D-8BFED9D7979C}" srcOrd="0" destOrd="4" presId="urn:microsoft.com/office/officeart/2005/8/layout/hList1"/>
+    <dgm:cxn modelId="{B60FBCAA-5359-49D6-86ED-9C89DA2D0F62}" type="presOf" srcId="{2BF605B4-1388-4EA1-A0AC-5961E65B4EEC}" destId="{7211202F-3508-455D-AA5D-8BFED9D7979C}" srcOrd="0" destOrd="9" presId="urn:microsoft.com/office/officeart/2005/8/layout/hList1"/>
     <dgm:cxn modelId="{165F1BAD-3B0A-410D-A6E4-2B2AB7D55BA5}" type="presOf" srcId="{4DA4A92C-2A05-4013-A0A5-13CEA104548B}" destId="{32670E83-9662-49B5-B4CD-6571F2B94065}" srcOrd="0" destOrd="8" presId="urn:microsoft.com/office/officeart/2005/8/layout/hList1"/>
     <dgm:cxn modelId="{AEAC63AE-AA06-46F3-8074-9D9B3E492608}" srcId="{9E01513E-E269-4692-9ED8-05E83E5F9A5B}" destId="{2BED4457-4F4B-4319-83B7-111B6426A2CF}" srcOrd="6" destOrd="0" parTransId="{86E6C403-9463-49F5-B174-6DADD4C3932D}" sibTransId="{48F2855C-98BB-444B-96A0-B72B46410936}"/>
     <dgm:cxn modelId="{9EA173B0-981C-43B4-8DDA-2BFEF86C6F67}" srcId="{9E01513E-E269-4692-9ED8-05E83E5F9A5B}" destId="{67EC8B82-E343-4C9F-B1B3-9EF381BF24A7}" srcOrd="3" destOrd="0" parTransId="{BE9646A5-3AFB-4204-BD8E-465643338DFC}" sibTransId="{EDA23477-C453-4535-8773-471312860B02}"/>
     <dgm:cxn modelId="{30F109B6-12FD-4E91-832C-3C7E4B30FA73}" type="presOf" srcId="{E3CFC22A-2914-43D5-8818-93AC67785ABA}" destId="{7211202F-3508-455D-AA5D-8BFED9D7979C}" srcOrd="0" destOrd="6" presId="urn:microsoft.com/office/officeart/2005/8/layout/hList1"/>
-    <dgm:cxn modelId="{CF0140B7-05EA-4496-9534-2F3839E95D9C}" type="presOf" srcId="{E224C2D2-557F-4D35-9E96-48F67CC78AC5}" destId="{7211202F-3508-455D-AA5D-8BFED9D7979C}" srcOrd="0" destOrd="9" presId="urn:microsoft.com/office/officeart/2005/8/layout/hList1"/>
+    <dgm:cxn modelId="{CF0140B7-05EA-4496-9534-2F3839E95D9C}" type="presOf" srcId="{E224C2D2-557F-4D35-9E96-48F67CC78AC5}" destId="{7211202F-3508-455D-AA5D-8BFED9D7979C}" srcOrd="0" destOrd="10" presId="urn:microsoft.com/office/officeart/2005/8/layout/hList1"/>
     <dgm:cxn modelId="{790215C9-753E-4437-BFA0-23C9E19F10E3}" srcId="{84E18807-37B4-4C7B-A8EA-5E677CC9FFE6}" destId="{9AA99167-3C3A-4773-9E93-C36B67B23851}" srcOrd="2" destOrd="0" parTransId="{DAF9CD91-E27B-4834-81B1-92F40F56CC71}" sibTransId="{47F82024-7A02-497E-AB5A-1B8729B28BCD}"/>
     <dgm:cxn modelId="{FD09D2C9-B7D9-47A8-A70B-9A2FBAD91D6B}" type="presOf" srcId="{2BED4457-4F4B-4319-83B7-111B6426A2CF}" destId="{32670E83-9662-49B5-B4CD-6571F2B94065}" srcOrd="0" destOrd="7" presId="urn:microsoft.com/office/officeart/2005/8/layout/hList1"/>
     <dgm:cxn modelId="{0F75FED9-7FBA-4015-8C73-2EC02D550B27}" srcId="{F5BFE493-4D5F-4F9B-A702-86E027246956}" destId="{84E18807-37B4-4C7B-A8EA-5E677CC9FFE6}" srcOrd="0" destOrd="0" parTransId="{88E936DE-7C64-4B3C-A69D-0FBB9C0BDE0D}" sibTransId="{D57D988B-7623-48E8-A71C-A97FF8C35790}"/>
@@ -7009,14 +7048,14 @@
             <a:buChar char="•"/>
           </a:pPr>
           <a:r>
-            <a:rPr lang="en-GB" sz="1500" kern="1200" dirty="0" err="1"/>
+            <a:rPr lang="en-GB" sz="1500" u="sng" kern="1200" dirty="0" err="1"/>
             <a:t>Todo</a:t>
           </a:r>
           <a:r>
-            <a:rPr lang="en-GB" sz="1500" kern="1200" dirty="0"/>
+            <a:rPr lang="en-GB" sz="1500" u="sng" kern="1200" dirty="0"/>
             <a:t> app</a:t>
           </a:r>
-          <a:endParaRPr lang="fr-FR" sz="1500" kern="1200" dirty="0"/>
+          <a:endParaRPr lang="fr-FR" sz="1500" u="sng" kern="1200" dirty="0"/>
         </a:p>
         <a:p>
           <a:pPr marL="228600" lvl="2" indent="-114300" algn="l" defTabSz="666750">
@@ -7032,10 +7071,10 @@
             <a:buChar char="•"/>
           </a:pPr>
           <a:r>
-            <a:rPr lang="en-GB" sz="1500" kern="1200" dirty="0"/>
+            <a:rPr lang="en-GB" sz="1500" u="sng" kern="1200" dirty="0"/>
             <a:t>Quiz app</a:t>
           </a:r>
-          <a:endParaRPr lang="fr-FR" sz="1500" kern="1200" dirty="0"/>
+          <a:endParaRPr lang="fr-FR" sz="1500" u="sng" kern="1200" dirty="0"/>
         </a:p>
         <a:p>
           <a:pPr marL="228600" lvl="2" indent="-114300" algn="l" defTabSz="666750">
@@ -7051,10 +7090,10 @@
             <a:buChar char="•"/>
           </a:pPr>
           <a:r>
-            <a:rPr lang="en-GB" sz="1500" kern="1200" dirty="0"/>
+            <a:rPr lang="en-GB" sz="1500" u="sng" kern="1200" dirty="0"/>
             <a:t>Notes app</a:t>
           </a:r>
-          <a:endParaRPr lang="fr-FR" sz="1500" kern="1200" dirty="0"/>
+          <a:endParaRPr lang="fr-FR" sz="1500" u="sng" kern="1200" dirty="0"/>
         </a:p>
         <a:p>
           <a:pPr marL="228600" lvl="2" indent="-114300" algn="l" defTabSz="666750">
@@ -7070,10 +7109,10 @@
             <a:buChar char="•"/>
           </a:pPr>
           <a:r>
-            <a:rPr lang="en-GB" sz="1500" kern="1200" dirty="0"/>
+            <a:rPr lang="en-GB" sz="1500" i="0" u="sng" kern="1200" dirty="0"/>
             <a:t>Quote generator</a:t>
           </a:r>
-          <a:endParaRPr lang="fr-FR" sz="1500" kern="1200" dirty="0"/>
+          <a:endParaRPr lang="fr-FR" sz="1500" i="0" u="sng" kern="1200" dirty="0"/>
         </a:p>
         <a:p>
           <a:pPr marL="228600" lvl="2" indent="-114300" algn="l" defTabSz="666750">
@@ -7089,10 +7128,10 @@
             <a:buChar char="•"/>
           </a:pPr>
           <a:r>
-            <a:rPr lang="en-GB" sz="1500" kern="1200" dirty="0"/>
+            <a:rPr lang="en-GB" sz="1500" u="sng" kern="1200" dirty="0"/>
             <a:t>Age calculator</a:t>
           </a:r>
-          <a:endParaRPr lang="fr-FR" sz="1500" kern="1200" dirty="0"/>
+          <a:endParaRPr lang="fr-FR" sz="1500" u="sng" kern="1200" dirty="0"/>
         </a:p>
         <a:p>
           <a:pPr marL="228600" lvl="2" indent="-114300" algn="l" defTabSz="666750">
@@ -7111,7 +7150,7 @@
             <a:rPr lang="en-GB" sz="1500" kern="1200" dirty="0"/>
             <a:t>Weather app</a:t>
           </a:r>
-          <a:endParaRPr lang="fr-FR" sz="1500" kern="1200" dirty="0"/>
+          <a:endParaRPr lang="fr-FR" sz="1500" u="sng" kern="1200" dirty="0"/>
         </a:p>
         <a:p>
           <a:pPr marL="228600" lvl="2" indent="-114300" algn="l" defTabSz="666750">
@@ -7127,14 +7166,14 @@
             <a:buChar char="•"/>
           </a:pPr>
           <a:r>
-            <a:rPr lang="en-GB" sz="1500" kern="1200" dirty="0" err="1"/>
+            <a:rPr lang="en-GB" sz="1500" u="sng" kern="1200" dirty="0" err="1"/>
             <a:t>OpenAPI</a:t>
           </a:r>
           <a:r>
-            <a:rPr lang="en-GB" sz="1500" kern="1200" dirty="0"/>
+            <a:rPr lang="en-GB" sz="1500" u="sng" kern="1200" dirty="0"/>
             <a:t> AI draw app</a:t>
           </a:r>
-          <a:endParaRPr lang="fr-FR" sz="1500" kern="1200" dirty="0"/>
+          <a:endParaRPr lang="fr-FR" sz="1500" u="sng" kern="1200" dirty="0"/>
         </a:p>
         <a:p>
           <a:pPr marL="228600" lvl="2" indent="-114300" algn="l" defTabSz="666750">
@@ -7150,10 +7189,10 @@
             <a:buChar char="•"/>
           </a:pPr>
           <a:r>
-            <a:rPr lang="en-GB" sz="1500" kern="1200" dirty="0"/>
+            <a:rPr lang="en-GB" sz="1500" u="sng" kern="1200" dirty="0"/>
             <a:t>Password validator</a:t>
           </a:r>
-          <a:endParaRPr lang="fr-FR" sz="1500" kern="1200" dirty="0"/>
+          <a:endParaRPr lang="fr-FR" sz="1500" u="sng" kern="1200" dirty="0"/>
         </a:p>
         <a:p>
           <a:pPr marL="228600" lvl="2" indent="-114300" algn="l" defTabSz="666750">
@@ -7169,10 +7208,10 @@
             <a:buChar char="•"/>
           </a:pPr>
           <a:r>
-            <a:rPr lang="en-GB" sz="1500" kern="1200" dirty="0"/>
+            <a:rPr lang="en-GB" sz="1500" u="sng" kern="1200" dirty="0"/>
             <a:t>Chrome extension</a:t>
           </a:r>
-          <a:endParaRPr lang="fr-FR" sz="1500" kern="1200" dirty="0"/>
+          <a:endParaRPr lang="fr-FR" sz="1500" u="sng" kern="1200" dirty="0"/>
         </a:p>
         <a:p>
           <a:pPr marL="228600" lvl="2" indent="-114300" algn="l" defTabSz="666750">
@@ -7188,10 +7227,10 @@
             <a:buChar char="•"/>
           </a:pPr>
           <a:r>
-            <a:rPr lang="en-GB" sz="1500" kern="1200" dirty="0"/>
+            <a:rPr lang="en-GB" sz="1500" u="sng" kern="1200" dirty="0"/>
             <a:t>File uploader</a:t>
           </a:r>
-          <a:endParaRPr lang="fr-FR" sz="1500" kern="1200" dirty="0"/>
+          <a:endParaRPr lang="fr-FR" sz="1500" u="sng" kern="1200" dirty="0"/>
         </a:p>
       </dsp:txBody>
       <dsp:txXfrm>
@@ -7508,6 +7547,25 @@
           <a:r>
             <a:rPr lang="en-GB" sz="1500" kern="1200" dirty="0"/>
             <a:t>Membership App API</a:t>
+          </a:r>
+          <a:endParaRPr lang="fr-FR" sz="1500" kern="1200" dirty="0"/>
+        </a:p>
+        <a:p>
+          <a:pPr marL="228600" lvl="2" indent="-114300" algn="l" defTabSz="666750">
+            <a:lnSpc>
+              <a:spcPct val="90000"/>
+            </a:lnSpc>
+            <a:spcBef>
+              <a:spcPct val="0"/>
+            </a:spcBef>
+            <a:spcAft>
+              <a:spcPct val="15000"/>
+            </a:spcAft>
+            <a:buChar char="•"/>
+          </a:pPr>
+          <a:r>
+            <a:rPr lang="en-GB" sz="1500" kern="1200" dirty="0"/>
+            <a:t>Notes app API</a:t>
           </a:r>
           <a:endParaRPr lang="fr-FR" sz="1500" kern="1200" dirty="0"/>
         </a:p>
@@ -14518,7 +14576,7 @@
           <a:p>
             <a:fld id="{C2E97FD6-B269-4CD7-A073-512C01108090}" type="datetimeFigureOut">
               <a:rPr lang="fr-FR" smtClean="0"/>
-              <a:t>25/09/2023</a:t>
+              <a:t>26/09/2023</a:t>
             </a:fld>
             <a:endParaRPr lang="fr-FR"/>
           </a:p>
@@ -14726,7 +14784,7 @@
           <a:p>
             <a:fld id="{C2E97FD6-B269-4CD7-A073-512C01108090}" type="datetimeFigureOut">
               <a:rPr lang="fr-FR" smtClean="0"/>
-              <a:t>25/09/2023</a:t>
+              <a:t>26/09/2023</a:t>
             </a:fld>
             <a:endParaRPr lang="fr-FR"/>
           </a:p>
@@ -14982,7 +15040,7 @@
           <a:p>
             <a:fld id="{C2E97FD6-B269-4CD7-A073-512C01108090}" type="datetimeFigureOut">
               <a:rPr lang="fr-FR" smtClean="0"/>
-              <a:t>25/09/2023</a:t>
+              <a:t>26/09/2023</a:t>
             </a:fld>
             <a:endParaRPr lang="fr-FR"/>
           </a:p>
@@ -15152,7 +15210,7 @@
           <a:p>
             <a:fld id="{C2E97FD6-B269-4CD7-A073-512C01108090}" type="datetimeFigureOut">
               <a:rPr lang="fr-FR" smtClean="0"/>
-              <a:t>25/09/2023</a:t>
+              <a:t>26/09/2023</a:t>
             </a:fld>
             <a:endParaRPr lang="fr-FR"/>
           </a:p>
@@ -15495,7 +15553,7 @@
           <a:p>
             <a:fld id="{C2E97FD6-B269-4CD7-A073-512C01108090}" type="datetimeFigureOut">
               <a:rPr lang="fr-FR" smtClean="0"/>
-              <a:t>25/09/2023</a:t>
+              <a:t>26/09/2023</a:t>
             </a:fld>
             <a:endParaRPr lang="fr-FR"/>
           </a:p>
@@ -15770,7 +15828,7 @@
           <a:p>
             <a:fld id="{C2E97FD6-B269-4CD7-A073-512C01108090}" type="datetimeFigureOut">
               <a:rPr lang="fr-FR" smtClean="0"/>
-              <a:t>25/09/2023</a:t>
+              <a:t>26/09/2023</a:t>
             </a:fld>
             <a:endParaRPr lang="fr-FR"/>
           </a:p>
@@ -16149,7 +16207,7 @@
           <a:p>
             <a:fld id="{C2E97FD6-B269-4CD7-A073-512C01108090}" type="datetimeFigureOut">
               <a:rPr lang="fr-FR" smtClean="0"/>
-              <a:t>25/09/2023</a:t>
+              <a:t>26/09/2023</a:t>
             </a:fld>
             <a:endParaRPr lang="fr-FR"/>
           </a:p>
@@ -16267,7 +16325,7 @@
           <a:p>
             <a:fld id="{C2E97FD6-B269-4CD7-A073-512C01108090}" type="datetimeFigureOut">
               <a:rPr lang="fr-FR" smtClean="0"/>
-              <a:t>25/09/2023</a:t>
+              <a:t>26/09/2023</a:t>
             </a:fld>
             <a:endParaRPr lang="fr-FR"/>
           </a:p>
@@ -16438,7 +16496,7 @@
           <a:p>
             <a:fld id="{C2E97FD6-B269-4CD7-A073-512C01108090}" type="datetimeFigureOut">
               <a:rPr lang="fr-FR" smtClean="0"/>
-              <a:t>25/09/2023</a:t>
+              <a:t>26/09/2023</a:t>
             </a:fld>
             <a:endParaRPr lang="fr-FR"/>
           </a:p>
@@ -16792,7 +16850,7 @@
           <a:p>
             <a:fld id="{C2E97FD6-B269-4CD7-A073-512C01108090}" type="datetimeFigureOut">
               <a:rPr lang="fr-FR" smtClean="0"/>
-              <a:t>25/09/2023</a:t>
+              <a:t>26/09/2023</a:t>
             </a:fld>
             <a:endParaRPr lang="fr-FR"/>
           </a:p>
@@ -17169,7 +17227,7 @@
           <a:p>
             <a:fld id="{C2E97FD6-B269-4CD7-A073-512C01108090}" type="datetimeFigureOut">
               <a:rPr lang="fr-FR" smtClean="0"/>
-              <a:t>25/09/2023</a:t>
+              <a:t>26/09/2023</a:t>
             </a:fld>
             <a:endParaRPr lang="fr-FR"/>
           </a:p>
@@ -17456,7 +17514,7 @@
           <a:p>
             <a:fld id="{C2E97FD6-B269-4CD7-A073-512C01108090}" type="datetimeFigureOut">
               <a:rPr lang="fr-FR" smtClean="0"/>
-              <a:t>25/09/2023</a:t>
+              <a:t>26/09/2023</a:t>
             </a:fld>
             <a:endParaRPr lang="fr-FR"/>
           </a:p>
@@ -18445,7 +18503,7 @@
             <p:ph idx="1"/>
             <p:extLst>
               <p:ext uri="{D42A27DB-BD31-4B8C-83A1-F6EECF244321}">
-                <p14:modId xmlns:p14="http://schemas.microsoft.com/office/powerpoint/2010/main" val="855606979"/>
+                <p14:modId xmlns:p14="http://schemas.microsoft.com/office/powerpoint/2010/main" val="918812283"/>
               </p:ext>
             </p:extLst>
           </p:nvPr>

</xml_diff>